<commit_message>
added link to videos
</commit_message>
<xml_diff>
--- a/docs/MonthlyPresentation/20150608_PRAVEEN.pptx
+++ b/docs/MonthlyPresentation/20150608_PRAVEEN.pptx
@@ -5,7 +5,7 @@
     <p:sldMasterId id="2147483660" r:id="rId1"/>
   </p:sldMasterIdLst>
   <p:notesMasterIdLst>
-    <p:notesMasterId r:id="rId11"/>
+    <p:notesMasterId r:id="rId12"/>
   </p:notesMasterIdLst>
   <p:sldIdLst>
     <p:sldId id="256" r:id="rId2"/>
@@ -15,8 +15,9 @@
     <p:sldId id="269" r:id="rId6"/>
     <p:sldId id="278" r:id="rId7"/>
     <p:sldId id="276" r:id="rId8"/>
-    <p:sldId id="279" r:id="rId9"/>
-    <p:sldId id="270" r:id="rId10"/>
+    <p:sldId id="280" r:id="rId9"/>
+    <p:sldId id="279" r:id="rId10"/>
+    <p:sldId id="270" r:id="rId11"/>
   </p:sldIdLst>
   <p:sldSz cx="9144000" cy="5143500" type="screen16x9"/>
   <p:notesSz cx="6858000" cy="9144000"/>
@@ -5094,9 +5095,135 @@
   <p:clrMapOvr>
     <a:masterClrMapping/>
   </p:clrMapOvr>
-  <p:transition spd="slow">
-    <p:cut/>
-  </p:transition>
+  <mc:AlternateContent xmlns:mc="http://schemas.openxmlformats.org/markup-compatibility/2006" xmlns:p14="http://schemas.microsoft.com/office/powerpoint/2010/main">
+    <mc:Choice Requires="p14">
+      <p:transition spd="med" p14:dur="700">
+        <p:fade/>
+      </p:transition>
+    </mc:Choice>
+    <mc:Fallback xmlns="">
+      <p:transition spd="med">
+        <p:fade/>
+      </p:transition>
+    </mc:Fallback>
+  </mc:AlternateContent>
+  <p:timing>
+    <p:tnLst>
+      <p:par>
+        <p:cTn id="1" dur="indefinite" restart="never" nodeType="tmRoot"/>
+      </p:par>
+    </p:tnLst>
+  </p:timing>
+</p:sld>
+</file>
+
+<file path=ppt/slides/slide10.xml><?xml version="1.0" encoding="utf-8"?>
+<p:sld xmlns:a="http://schemas.openxmlformats.org/drawingml/2006/main" xmlns:r="http://schemas.openxmlformats.org/officeDocument/2006/relationships" xmlns:p="http://schemas.openxmlformats.org/presentationml/2006/main">
+  <p:cSld>
+    <p:spTree>
+      <p:nvGrpSpPr>
+        <p:cNvPr id="1" name=""/>
+        <p:cNvGrpSpPr/>
+        <p:nvPr/>
+      </p:nvGrpSpPr>
+      <p:grpSpPr>
+        <a:xfrm>
+          <a:off x="0" y="0"/>
+          <a:ext cx="0" cy="0"/>
+          <a:chOff x="0" y="0"/>
+          <a:chExt cx="0" cy="0"/>
+        </a:xfrm>
+      </p:grpSpPr>
+      <p:sp>
+        <p:nvSpPr>
+          <p:cNvPr id="6" name="タイトル 5"/>
+          <p:cNvSpPr>
+            <a:spLocks noGrp="1"/>
+          </p:cNvSpPr>
+          <p:nvPr>
+            <p:ph type="title"/>
+          </p:nvPr>
+        </p:nvSpPr>
+        <p:spPr/>
+        <p:txBody>
+          <a:bodyPr/>
+          <a:lstStyle/>
+          <a:p>
+            <a:endParaRPr lang="en-US"/>
+          </a:p>
+        </p:txBody>
+      </p:sp>
+      <p:sp>
+        <p:nvSpPr>
+          <p:cNvPr id="7" name="テキスト プレースホルダー 6"/>
+          <p:cNvSpPr>
+            <a:spLocks noGrp="1"/>
+          </p:cNvSpPr>
+          <p:nvPr>
+            <p:ph type="body" idx="1"/>
+          </p:nvPr>
+        </p:nvSpPr>
+        <p:spPr/>
+        <p:txBody>
+          <a:bodyPr/>
+          <a:lstStyle/>
+          <a:p>
+            <a:endParaRPr lang="en-US" dirty="0"/>
+          </a:p>
+        </p:txBody>
+      </p:sp>
+      <p:sp>
+        <p:nvSpPr>
+          <p:cNvPr id="8" name="テキスト ボックス 7"/>
+          <p:cNvSpPr txBox="1"/>
+          <p:nvPr/>
+        </p:nvSpPr>
+        <p:spPr>
+          <a:xfrm>
+            <a:off x="1355461" y="2307569"/>
+            <a:ext cx="6379862" cy="584775"/>
+          </a:xfrm>
+          <a:prstGeom prst="rect">
+            <a:avLst/>
+          </a:prstGeom>
+          <a:noFill/>
+        </p:spPr>
+        <p:txBody>
+          <a:bodyPr wrap="square" rtlCol="0">
+            <a:spAutoFit/>
+          </a:bodyPr>
+          <a:lstStyle/>
+          <a:p>
+            <a:pPr algn="ctr"/>
+            <a:r>
+              <a:rPr lang="en-US" sz="3200" b="1" dirty="0" smtClean="0"/>
+              <a:t>Thank you for your attention!</a:t>
+            </a:r>
+          </a:p>
+        </p:txBody>
+      </p:sp>
+    </p:spTree>
+    <p:extLst>
+      <p:ext uri="{BB962C8B-B14F-4D97-AF65-F5344CB8AC3E}">
+        <p14:creationId xmlns:p14="http://schemas.microsoft.com/office/powerpoint/2010/main" val="788678208"/>
+      </p:ext>
+    </p:extLst>
+  </p:cSld>
+  <p:clrMapOvr>
+    <a:masterClrMapping/>
+  </p:clrMapOvr>
+  <mc:AlternateContent xmlns:mc="http://schemas.openxmlformats.org/markup-compatibility/2006" xmlns:p14="http://schemas.microsoft.com/office/powerpoint/2010/main">
+    <mc:Choice Requires="p14">
+      <p:transition spd="med" p14:dur="700">
+        <p:fade/>
+      </p:transition>
+    </mc:Choice>
+    <mc:Fallback xmlns="">
+      <p:transition spd="med">
+        <p:fade/>
+      </p:transition>
+    </mc:Fallback>
+  </mc:AlternateContent>
   <p:timing>
     <p:tnLst>
       <p:par>
@@ -5374,9 +5501,18 @@
   <p:clrMapOvr>
     <a:masterClrMapping/>
   </p:clrMapOvr>
-  <p:transition spd="slow">
-    <p:cut/>
-  </p:transition>
+  <mc:AlternateContent xmlns:mc="http://schemas.openxmlformats.org/markup-compatibility/2006" xmlns:p14="http://schemas.microsoft.com/office/powerpoint/2010/main">
+    <mc:Choice Requires="p14">
+      <p:transition spd="med" p14:dur="700">
+        <p:fade/>
+      </p:transition>
+    </mc:Choice>
+    <mc:Fallback xmlns="">
+      <p:transition spd="med">
+        <p:fade/>
+      </p:transition>
+    </mc:Fallback>
+  </mc:AlternateContent>
   <p:timing>
     <p:tnLst>
       <p:par>
@@ -5810,11 +5946,7 @@
             <a:pPr algn="ctr"/>
             <a:r>
               <a:rPr lang="en-US" dirty="0" smtClean="0"/>
-              <a:t>2. Declarative </a:t>
-            </a:r>
-            <a:r>
-              <a:rPr lang="en-US" dirty="0" smtClean="0"/>
-              <a:t>JSON</a:t>
+              <a:t>2. Declarative JSON</a:t>
             </a:r>
             <a:endParaRPr lang="en-US" dirty="0"/>
           </a:p>
@@ -7092,6 +7224,18 @@
   <p:clrMapOvr>
     <a:masterClrMapping/>
   </p:clrMapOvr>
+  <mc:AlternateContent xmlns:mc="http://schemas.openxmlformats.org/markup-compatibility/2006" xmlns:p14="http://schemas.microsoft.com/office/powerpoint/2010/main">
+    <mc:Choice Requires="p14">
+      <p:transition spd="med" p14:dur="700">
+        <p:fade/>
+      </p:transition>
+    </mc:Choice>
+    <mc:Fallback xmlns="">
+      <p:transition spd="med">
+        <p:fade/>
+      </p:transition>
+    </mc:Fallback>
+  </mc:AlternateContent>
   <p:timing>
     <p:tnLst>
       <p:par>
@@ -7113,7 +7257,7 @@
                             </p:stCondLst>
                             <p:childTnLst>
                               <p:par>
-                                <p:cTn id="5" presetID="1" presetClass="entr" presetSubtype="0" fill="hold" nodeType="clickEffect">
+                                <p:cTn id="5" presetID="10" presetClass="entr" presetSubtype="0" fill="hold" nodeType="clickEffect">
                                   <p:stCondLst>
                                     <p:cond delay="0"/>
                                   </p:stCondLst>
@@ -7136,6 +7280,14 @@
                                         <p:strVal val="visible"/>
                                       </p:to>
                                     </p:set>
+                                    <p:animEffect transition="in" filter="fade">
+                                      <p:cBhvr>
+                                        <p:cTn id="7" dur="500"/>
+                                        <p:tgtEl>
+                                          <p:spTgt spid="3"/>
+                                        </p:tgtEl>
+                                      </p:cBhvr>
+                                    </p:animEffect>
                                   </p:childTnLst>
                                 </p:cTn>
                               </p:par>
@@ -7146,26 +7298,26 @@
                     </p:cTn>
                   </p:par>
                   <p:par>
-                    <p:cTn id="7" fill="hold">
+                    <p:cTn id="8" fill="hold">
                       <p:stCondLst>
                         <p:cond delay="indefinite"/>
                       </p:stCondLst>
                       <p:childTnLst>
                         <p:par>
-                          <p:cTn id="8" fill="hold">
+                          <p:cTn id="9" fill="hold">
                             <p:stCondLst>
                               <p:cond delay="0"/>
                             </p:stCondLst>
                             <p:childTnLst>
                               <p:par>
-                                <p:cTn id="9" presetID="1" presetClass="entr" presetSubtype="0" fill="hold" nodeType="clickEffect">
+                                <p:cTn id="10" presetID="10" presetClass="entr" presetSubtype="0" fill="hold" nodeType="clickEffect">
                                   <p:stCondLst>
                                     <p:cond delay="0"/>
                                   </p:stCondLst>
                                   <p:childTnLst>
                                     <p:set>
                                       <p:cBhvr>
-                                        <p:cTn id="10" dur="1" fill="hold">
+                                        <p:cTn id="11" dur="1" fill="hold">
                                           <p:stCondLst>
                                             <p:cond delay="0"/>
                                           </p:stCondLst>
@@ -7181,18 +7333,26 @@
                                         <p:strVal val="visible"/>
                                       </p:to>
                                     </p:set>
+                                    <p:animEffect transition="in" filter="fade">
+                                      <p:cBhvr>
+                                        <p:cTn id="12" dur="500"/>
+                                        <p:tgtEl>
+                                          <p:spTgt spid="4"/>
+                                        </p:tgtEl>
+                                      </p:cBhvr>
+                                    </p:animEffect>
                                   </p:childTnLst>
                                 </p:cTn>
                               </p:par>
                               <p:par>
-                                <p:cTn id="11" presetID="1" presetClass="entr" presetSubtype="0" fill="hold" grpId="0" nodeType="withEffect">
+                                <p:cTn id="13" presetID="1" presetClass="entr" presetSubtype="0" fill="hold" grpId="0" nodeType="withEffect">
                                   <p:stCondLst>
                                     <p:cond delay="0"/>
                                   </p:stCondLst>
                                   <p:childTnLst>
                                     <p:set>
                                       <p:cBhvr>
-                                        <p:cTn id="12" dur="1" fill="hold">
+                                        <p:cTn id="14" dur="1" fill="hold">
                                           <p:stCondLst>
                                             <p:cond delay="0"/>
                                           </p:stCondLst>
@@ -7374,6 +7534,18 @@
   <p:clrMapOvr>
     <a:masterClrMapping/>
   </p:clrMapOvr>
+  <mc:AlternateContent xmlns:mc="http://schemas.openxmlformats.org/markup-compatibility/2006" xmlns:p14="http://schemas.microsoft.com/office/powerpoint/2010/main">
+    <mc:Choice Requires="p14">
+      <p:transition spd="med" p14:dur="700">
+        <p:fade/>
+      </p:transition>
+    </mc:Choice>
+    <mc:Fallback xmlns="">
+      <p:transition spd="med">
+        <p:fade/>
+      </p:transition>
+    </mc:Fallback>
+  </mc:AlternateContent>
   <p:timing>
     <p:tnLst>
       <p:par>
@@ -7482,11 +7654,7 @@
           <a:p>
             <a:r>
               <a:rPr lang="en-US" sz="1600" dirty="0" smtClean="0"/>
-              <a:t>  </a:t>
-            </a:r>
-            <a:r>
-              <a:rPr lang="en-US" sz="1600" dirty="0" smtClean="0"/>
-              <a:t>Improvement to the behavior program parser.</a:t>
+              <a:t>  Improvement to the behavior program parser.</a:t>
             </a:r>
           </a:p>
           <a:p>
@@ -7503,7 +7671,6 @@
               <a:rPr lang="en-US" sz="1600" dirty="0" smtClean="0"/>
               <a:t> Dynamic expression evaluator for program termination etc.,</a:t>
             </a:r>
-            <a:endParaRPr lang="en-US" sz="1600" dirty="0" smtClean="0"/>
           </a:p>
           <a:p>
             <a:endParaRPr lang="en-US" sz="1600" dirty="0" smtClean="0"/>
@@ -7515,11 +7682,7 @@
             </a:r>
             <a:r>
               <a:rPr lang="en-US" sz="1600" dirty="0" smtClean="0"/>
-              <a:t> </a:t>
-            </a:r>
-            <a:r>
-              <a:rPr lang="en-US" sz="1600" dirty="0" smtClean="0"/>
-              <a:t>Nao Behavior Execution module improvement</a:t>
+              <a:t> Nao Behavior Execution module improvement</a:t>
             </a:r>
           </a:p>
           <a:p>
@@ -7533,11 +7696,7 @@
             <a:pPr lvl="1"/>
             <a:r>
               <a:rPr lang="en-US" sz="1600" dirty="0" smtClean="0"/>
-              <a:t>Each action </a:t>
-            </a:r>
-            <a:r>
-              <a:rPr lang="en-US" sz="1600" dirty="0" smtClean="0"/>
-              <a:t>is composed of &lt;</a:t>
+              <a:t>Each action is composed of &lt;</a:t>
             </a:r>
             <a:r>
               <a:rPr lang="en-US" sz="1600" dirty="0" err="1" smtClean="0"/>
@@ -7565,7 +7724,6 @@
               <a:rPr lang="en-US" sz="1600" dirty="0" smtClean="0"/>
               <a:t> library - incomplete</a:t>
             </a:r>
-            <a:endParaRPr lang="en-US" sz="1600" dirty="0" smtClean="0"/>
           </a:p>
           <a:p>
             <a:pPr marL="254000" indent="0">
@@ -7619,6 +7777,18 @@
   <p:clrMapOvr>
     <a:masterClrMapping/>
   </p:clrMapOvr>
+  <mc:AlternateContent xmlns:mc="http://schemas.openxmlformats.org/markup-compatibility/2006" xmlns:p14="http://schemas.microsoft.com/office/powerpoint/2010/main">
+    <mc:Choice Requires="p14">
+      <p:transition spd="med" p14:dur="700">
+        <p:fade/>
+      </p:transition>
+    </mc:Choice>
+    <mc:Fallback xmlns="">
+      <p:transition spd="med">
+        <p:fade/>
+      </p:transition>
+    </mc:Fallback>
+  </mc:AlternateContent>
   <p:timing>
     <p:tnLst>
       <p:par>
@@ -7756,6 +7926,18 @@
   <p:clrMapOvr>
     <a:masterClrMapping/>
   </p:clrMapOvr>
+  <mc:AlternateContent xmlns:mc="http://schemas.openxmlformats.org/markup-compatibility/2006" xmlns:p14="http://schemas.microsoft.com/office/powerpoint/2010/main">
+    <mc:Choice Requires="p14">
+      <p:transition spd="med" p14:dur="700">
+        <p:fade/>
+      </p:transition>
+    </mc:Choice>
+    <mc:Fallback xmlns="">
+      <p:transition spd="med">
+        <p:fade/>
+      </p:transition>
+    </mc:Fallback>
+  </mc:AlternateContent>
   <p:timing>
     <p:tnLst>
       <p:par>
@@ -7800,11 +7982,7 @@
           <a:p>
             <a:r>
               <a:rPr lang="en-US" dirty="0" smtClean="0"/>
-              <a:t>  </a:t>
-            </a:r>
-            <a:r>
-              <a:rPr lang="en-US" dirty="0" smtClean="0"/>
-              <a:t>New robot actions</a:t>
+              <a:t>  New robot actions</a:t>
             </a:r>
             <a:endParaRPr lang="en-US" dirty="0"/>
           </a:p>
@@ -8720,6 +8898,18 @@
   <p:clrMapOvr>
     <a:masterClrMapping/>
   </p:clrMapOvr>
+  <mc:AlternateContent xmlns:mc="http://schemas.openxmlformats.org/markup-compatibility/2006" xmlns:p14="http://schemas.microsoft.com/office/powerpoint/2010/main">
+    <mc:Choice Requires="p14">
+      <p:transition spd="med" p14:dur="700">
+        <p:fade/>
+      </p:transition>
+    </mc:Choice>
+    <mc:Fallback xmlns="">
+      <p:transition spd="med">
+        <p:fade/>
+      </p:transition>
+    </mc:Fallback>
+  </mc:AlternateContent>
   <p:timing>
     <p:tnLst>
       <p:par>
@@ -8741,7 +8931,7 @@
                             </p:stCondLst>
                             <p:childTnLst>
                               <p:par>
-                                <p:cTn id="5" presetID="1" presetClass="entr" presetSubtype="0" fill="hold" nodeType="clickEffect">
+                                <p:cTn id="5" presetID="10" presetClass="entr" presetSubtype="0" fill="hold" nodeType="clickEffect">
                                   <p:stCondLst>
                                     <p:cond delay="0"/>
                                   </p:stCondLst>
@@ -8764,6 +8954,14 @@
                                         <p:strVal val="visible"/>
                                       </p:to>
                                     </p:set>
+                                    <p:animEffect transition="in" filter="fade">
+                                      <p:cBhvr>
+                                        <p:cTn id="7" dur="500"/>
+                                        <p:tgtEl>
+                                          <p:spTgt spid="46"/>
+                                        </p:tgtEl>
+                                      </p:cBhvr>
+                                    </p:animEffect>
                                   </p:childTnLst>
                                 </p:cTn>
                               </p:par>
@@ -8774,26 +8972,26 @@
                     </p:cTn>
                   </p:par>
                   <p:par>
-                    <p:cTn id="7" fill="hold">
+                    <p:cTn id="8" fill="hold">
                       <p:stCondLst>
                         <p:cond delay="indefinite"/>
                       </p:stCondLst>
                       <p:childTnLst>
                         <p:par>
-                          <p:cTn id="8" fill="hold">
+                          <p:cTn id="9" fill="hold">
                             <p:stCondLst>
                               <p:cond delay="0"/>
                             </p:stCondLst>
                             <p:childTnLst>
                               <p:par>
-                                <p:cTn id="9" presetID="8" presetClass="emph" presetSubtype="0" fill="hold" nodeType="clickEffect">
+                                <p:cTn id="10" presetID="8" presetClass="emph" presetSubtype="0" fill="hold" nodeType="clickEffect">
                                   <p:stCondLst>
                                     <p:cond delay="0"/>
                                   </p:stCondLst>
                                   <p:childTnLst>
                                     <p:animRot by="5400000">
                                       <p:cBhvr>
-                                        <p:cTn id="10" dur="2000" fill="hold"/>
+                                        <p:cTn id="11" dur="2000" fill="hold"/>
                                         <p:tgtEl>
                                           <p:spTgt spid="43"/>
                                         </p:tgtEl>
@@ -8812,26 +9010,26 @@
                     </p:cTn>
                   </p:par>
                   <p:par>
-                    <p:cTn id="11" fill="hold">
+                    <p:cTn id="12" fill="hold">
                       <p:stCondLst>
                         <p:cond delay="indefinite"/>
                       </p:stCondLst>
                       <p:childTnLst>
                         <p:par>
-                          <p:cTn id="12" fill="hold">
+                          <p:cTn id="13" fill="hold">
                             <p:stCondLst>
                               <p:cond delay="0"/>
                             </p:stCondLst>
                             <p:childTnLst>
                               <p:par>
-                                <p:cTn id="13" presetID="42" presetClass="path" presetSubtype="0" accel="50000" decel="50000" fill="hold" nodeType="clickEffect">
+                                <p:cTn id="14" presetID="42" presetClass="path" presetSubtype="0" accel="50000" decel="50000" fill="hold" nodeType="clickEffect">
                                   <p:stCondLst>
                                     <p:cond delay="0"/>
                                   </p:stCondLst>
                                   <p:childTnLst>
                                     <p:animMotion origin="layout" path="M 1.38889E-6 -3.45679E-6 L 0.11423 0.15124 " pathEditMode="relative" rAng="0" ptsTypes="AA">
                                       <p:cBhvr>
-                                        <p:cTn id="14" dur="2000" fill="hold"/>
+                                        <p:cTn id="15" dur="2000" fill="hold"/>
                                         <p:tgtEl>
                                           <p:spTgt spid="43"/>
                                         </p:tgtEl>
@@ -8910,7 +9108,7 @@
           <a:p>
             <a:r>
               <a:rPr lang="en-US" dirty="0" smtClean="0"/>
-              <a:t>  TODO List</a:t>
+              <a:t>  Results</a:t>
             </a:r>
             <a:endParaRPr lang="en-US" dirty="0"/>
           </a:p>
@@ -8931,77 +9129,140 @@
           <a:bodyPr/>
           <a:lstStyle/>
           <a:p>
-            <a:r>
-              <a:rPr lang="en-US" dirty="0" smtClean="0"/>
-              <a:t>Complete conference paper – Submission June 10, 2015</a:t>
-            </a:r>
-          </a:p>
-          <a:p>
-            <a:endParaRPr lang="en-US" dirty="0"/>
-          </a:p>
-          <a:p>
-            <a:r>
-              <a:rPr lang="en-US" dirty="0" smtClean="0"/>
-              <a:t>Thesis Documentation</a:t>
-            </a:r>
-          </a:p>
-          <a:p>
-            <a:endParaRPr lang="en-US" dirty="0"/>
-          </a:p>
-          <a:p>
-            <a:r>
-              <a:rPr lang="en-US" dirty="0" smtClean="0"/>
-              <a:t>User study </a:t>
-            </a:r>
-          </a:p>
-          <a:p>
-            <a:pPr lvl="1"/>
-            <a:r>
-              <a:rPr lang="en-US" dirty="0" smtClean="0"/>
-              <a:t>Think of scenarios</a:t>
-            </a:r>
-          </a:p>
-          <a:p>
-            <a:pPr lvl="1"/>
-            <a:r>
-              <a:rPr lang="en-US" dirty="0" smtClean="0"/>
-              <a:t>Collect user data</a:t>
-            </a:r>
-          </a:p>
-          <a:p>
-            <a:pPr lvl="1"/>
-            <a:endParaRPr lang="en-US" dirty="0"/>
-          </a:p>
-          <a:p>
-            <a:r>
-              <a:rPr lang="en-US" dirty="0" smtClean="0"/>
-              <a:t>Try to integrate with </a:t>
-            </a:r>
-            <a:r>
-              <a:rPr lang="en-US" dirty="0" err="1" smtClean="0"/>
-              <a:t>Turtlebot</a:t>
-            </a:r>
-            <a:r>
-              <a:rPr lang="en-US" dirty="0" smtClean="0"/>
-              <a:t> and Pepper?</a:t>
-            </a:r>
-          </a:p>
-          <a:p>
-            <a:endParaRPr lang="en-US" dirty="0"/>
-          </a:p>
-          <a:p>
-            <a:r>
-              <a:rPr lang="en-US" dirty="0" smtClean="0"/>
-              <a:t>Try to integrate IMU sensor??</a:t>
-            </a:r>
             <a:endParaRPr lang="en-US" dirty="0"/>
           </a:p>
         </p:txBody>
       </p:sp>
+      <p:sp>
+        <p:nvSpPr>
+          <p:cNvPr id="5" name="テキスト ボックス 4"/>
+          <p:cNvSpPr txBox="1"/>
+          <p:nvPr/>
+        </p:nvSpPr>
+        <p:spPr>
+          <a:xfrm>
+            <a:off x="716497" y="1156055"/>
+            <a:ext cx="3139001" cy="307777"/>
+          </a:xfrm>
+          <a:prstGeom prst="rect">
+            <a:avLst/>
+          </a:prstGeom>
+          <a:noFill/>
+        </p:spPr>
+        <p:txBody>
+          <a:bodyPr wrap="none" rtlCol="0">
+            <a:spAutoFit/>
+          </a:bodyPr>
+          <a:lstStyle/>
+          <a:p>
+            <a:r>
+              <a:rPr lang="en-US" dirty="0" smtClean="0"/>
+              <a:t>NAO as a demonstrator in a museum</a:t>
+            </a:r>
+            <a:endParaRPr lang="en-US" dirty="0"/>
+          </a:p>
+        </p:txBody>
+      </p:sp>
+      <p:sp>
+        <p:nvSpPr>
+          <p:cNvPr id="8" name="テキスト ボックス 7"/>
+          <p:cNvSpPr txBox="1"/>
+          <p:nvPr/>
+        </p:nvSpPr>
+        <p:spPr>
+          <a:xfrm>
+            <a:off x="5662478" y="1156055"/>
+            <a:ext cx="3237653" cy="307777"/>
+          </a:xfrm>
+          <a:prstGeom prst="rect">
+            <a:avLst/>
+          </a:prstGeom>
+          <a:noFill/>
+        </p:spPr>
+        <p:txBody>
+          <a:bodyPr wrap="square" rtlCol="0">
+            <a:spAutoFit/>
+          </a:bodyPr>
+          <a:lstStyle/>
+          <a:p>
+            <a:r>
+              <a:rPr lang="en-US" dirty="0" smtClean="0"/>
+              <a:t>NAO as a therapy facilitator</a:t>
+            </a:r>
+            <a:endParaRPr lang="en-US" dirty="0"/>
+          </a:p>
+        </p:txBody>
+      </p:sp>
+      <p:pic>
+        <p:nvPicPr>
+          <p:cNvPr id="9" name="MuseumScenario">
+            <a:hlinkClick r:id="" action="ppaction://media"/>
+          </p:cNvPr>
+          <p:cNvPicPr>
+            <a:picLocks noChangeAspect="1"/>
+          </p:cNvPicPr>
+          <p:nvPr>
+            <a:videoFile r:link="rId2"/>
+            <p:extLst>
+              <p:ext uri="{DAA4B4D4-6D71-4841-9C94-3DE7FCFB9230}">
+                <p14:media xmlns:p14="http://schemas.microsoft.com/office/powerpoint/2010/main" r:link="rId1"/>
+              </p:ext>
+            </p:extLst>
+          </p:nvPr>
+        </p:nvPicPr>
+        <p:blipFill>
+          <a:blip r:embed="rId6"/>
+          <a:stretch>
+            <a:fillRect/>
+          </a:stretch>
+        </p:blipFill>
+        <p:spPr>
+          <a:xfrm>
+            <a:off x="237065" y="1660737"/>
+            <a:ext cx="4192694" cy="2358390"/>
+          </a:xfrm>
+          <a:prstGeom prst="rect">
+            <a:avLst/>
+          </a:prstGeom>
+        </p:spPr>
+      </p:pic>
+      <p:pic>
+        <p:nvPicPr>
+          <p:cNvPr id="11" name="TherapyScenario">
+            <a:hlinkClick r:id="" action="ppaction://media"/>
+          </p:cNvPr>
+          <p:cNvPicPr>
+            <a:picLocks noChangeAspect="1"/>
+          </p:cNvPicPr>
+          <p:nvPr>
+            <a:videoFile r:link="rId4"/>
+            <p:extLst>
+              <p:ext uri="{DAA4B4D4-6D71-4841-9C94-3DE7FCFB9230}">
+                <p14:media xmlns:p14="http://schemas.microsoft.com/office/powerpoint/2010/main" r:link="rId3"/>
+              </p:ext>
+            </p:extLst>
+          </p:nvPr>
+        </p:nvPicPr>
+        <p:blipFill>
+          <a:blip r:embed="rId6"/>
+          <a:stretch>
+            <a:fillRect/>
+          </a:stretch>
+        </p:blipFill>
+        <p:spPr>
+          <a:xfrm>
+            <a:off x="4687118" y="1660737"/>
+            <a:ext cx="4192693" cy="2358390"/>
+          </a:xfrm>
+          <a:prstGeom prst="rect">
+            <a:avLst/>
+          </a:prstGeom>
+        </p:spPr>
+      </p:pic>
     </p:spTree>
     <p:extLst>
       <p:ext uri="{BB962C8B-B14F-4D97-AF65-F5344CB8AC3E}">
-        <p14:creationId xmlns:p14="http://schemas.microsoft.com/office/powerpoint/2010/main" val="1980707321"/>
+        <p14:creationId xmlns:p14="http://schemas.microsoft.com/office/powerpoint/2010/main" val="200595048"/>
       </p:ext>
     </p:extLst>
   </p:cSld>
@@ -9011,7 +9272,150 @@
   <p:timing>
     <p:tnLst>
       <p:par>
-        <p:cTn id="1" dur="indefinite" restart="never" nodeType="tmRoot"/>
+        <p:cTn id="1" dur="indefinite" restart="never" nodeType="tmRoot">
+          <p:childTnLst>
+            <p:seq concurrent="1" nextAc="seek">
+              <p:cTn id="2" restart="whenNotActive" fill="hold" evtFilter="cancelBubble" nodeType="interactiveSeq">
+                <p:stCondLst>
+                  <p:cond evt="onClick" delay="0">
+                    <p:tgtEl>
+                      <p:spTgt spid="9"/>
+                    </p:tgtEl>
+                  </p:cond>
+                </p:stCondLst>
+                <p:endSync evt="end" delay="0">
+                  <p:rtn val="all"/>
+                </p:endSync>
+                <p:childTnLst>
+                  <p:par>
+                    <p:cTn id="3" fill="hold">
+                      <p:stCondLst>
+                        <p:cond delay="0"/>
+                      </p:stCondLst>
+                      <p:childTnLst>
+                        <p:par>
+                          <p:cTn id="4" fill="hold">
+                            <p:stCondLst>
+                              <p:cond delay="0"/>
+                            </p:stCondLst>
+                            <p:childTnLst>
+                              <p:par>
+                                <p:cTn id="5" presetID="2" presetClass="mediacall" presetSubtype="0" fill="hold" nodeType="clickEffect">
+                                  <p:stCondLst>
+                                    <p:cond delay="0"/>
+                                  </p:stCondLst>
+                                  <p:childTnLst>
+                                    <p:cmd type="call" cmd="togglePause">
+                                      <p:cBhvr>
+                                        <p:cTn id="6" dur="1" fill="hold"/>
+                                        <p:tgtEl>
+                                          <p:spTgt spid="9"/>
+                                        </p:tgtEl>
+                                      </p:cBhvr>
+                                    </p:cmd>
+                                  </p:childTnLst>
+                                </p:cTn>
+                              </p:par>
+                            </p:childTnLst>
+                          </p:cTn>
+                        </p:par>
+                      </p:childTnLst>
+                    </p:cTn>
+                  </p:par>
+                </p:childTnLst>
+              </p:cTn>
+              <p:nextCondLst>
+                <p:cond evt="onClick" delay="0">
+                  <p:tgtEl>
+                    <p:spTgt spid="9"/>
+                  </p:tgtEl>
+                </p:cond>
+              </p:nextCondLst>
+            </p:seq>
+            <p:video fullScrn="1">
+              <p:cMediaNode vol="80000">
+                <p:cTn id="7" fill="hold" display="0">
+                  <p:stCondLst>
+                    <p:cond delay="indefinite"/>
+                  </p:stCondLst>
+                </p:cTn>
+                <p:tgtEl>
+                  <p:spTgt spid="9"/>
+                </p:tgtEl>
+              </p:cMediaNode>
+            </p:video>
+            <p:seq concurrent="1" nextAc="seek">
+              <p:cTn id="8" restart="whenNotActive" fill="hold" evtFilter="cancelBubble" nodeType="interactiveSeq">
+                <p:stCondLst>
+                  <p:cond evt="onClick" delay="0">
+                    <p:tgtEl>
+                      <p:spTgt spid="11"/>
+                    </p:tgtEl>
+                  </p:cond>
+                </p:stCondLst>
+                <p:endSync evt="end" delay="0">
+                  <p:rtn val="all"/>
+                </p:endSync>
+                <p:childTnLst>
+                  <p:par>
+                    <p:cTn id="9" fill="hold">
+                      <p:stCondLst>
+                        <p:cond delay="0"/>
+                      </p:stCondLst>
+                      <p:childTnLst>
+                        <p:par>
+                          <p:cTn id="10" fill="hold">
+                            <p:stCondLst>
+                              <p:cond delay="0"/>
+                            </p:stCondLst>
+                            <p:childTnLst>
+                              <p:par>
+                                <p:cTn id="11" presetID="2" presetClass="mediacall" presetSubtype="0" fill="hold" nodeType="clickEffect">
+                                  <p:stCondLst>
+                                    <p:cond delay="0"/>
+                                  </p:stCondLst>
+                                  <p:childTnLst>
+                                    <p:cmd type="call" cmd="togglePause">
+                                      <p:cBhvr>
+                                        <p:cTn id="12" dur="1" fill="hold"/>
+                                        <p:tgtEl>
+                                          <p:spTgt spid="11"/>
+                                        </p:tgtEl>
+                                      </p:cBhvr>
+                                    </p:cmd>
+                                  </p:childTnLst>
+                                </p:cTn>
+                              </p:par>
+                            </p:childTnLst>
+                          </p:cTn>
+                        </p:par>
+                      </p:childTnLst>
+                    </p:cTn>
+                  </p:par>
+                </p:childTnLst>
+              </p:cTn>
+              <p:nextCondLst>
+                <p:cond evt="onClick" delay="0">
+                  <p:tgtEl>
+                    <p:spTgt spid="11"/>
+                  </p:tgtEl>
+                </p:cond>
+              </p:nextCondLst>
+            </p:seq>
+            <p:video fullScrn="1">
+              <p:cMediaNode vol="80000">
+                <p:cTn id="13" fill="hold" display="0">
+                  <p:stCondLst>
+                    <p:cond delay="indefinite"/>
+                  </p:stCondLst>
+                </p:cTn>
+                <p:tgtEl>
+                  <p:spTgt spid="11"/>
+                </p:tgtEl>
+              </p:cMediaNode>
+            </p:video>
+          </p:childTnLst>
+        </p:cTn>
       </p:par>
     </p:tnLst>
   </p:timing>
@@ -9037,7 +9441,7 @@
       </p:grpSpPr>
       <p:sp>
         <p:nvSpPr>
-          <p:cNvPr id="6" name="タイトル 5"/>
+          <p:cNvPr id="2" name="タイトル 1"/>
           <p:cNvSpPr>
             <a:spLocks noGrp="1"/>
           </p:cNvSpPr>
@@ -9050,13 +9454,17 @@
           <a:bodyPr/>
           <a:lstStyle/>
           <a:p>
-            <a:endParaRPr lang="en-US"/>
+            <a:r>
+              <a:rPr lang="en-US" dirty="0" smtClean="0"/>
+              <a:t>  TODO List</a:t>
+            </a:r>
+            <a:endParaRPr lang="en-US" dirty="0"/>
           </a:p>
         </p:txBody>
       </p:sp>
       <p:sp>
         <p:nvSpPr>
-          <p:cNvPr id="7" name="テキスト プレースホルダー 6"/>
+          <p:cNvPr id="3" name="テキスト プレースホルダー 2"/>
           <p:cNvSpPr>
             <a:spLocks noGrp="1"/>
           </p:cNvSpPr>
@@ -9069,50 +9477,95 @@
           <a:bodyPr/>
           <a:lstStyle/>
           <a:p>
+            <a:r>
+              <a:rPr lang="en-US" dirty="0" smtClean="0"/>
+              <a:t>Complete conference paper – Submission June 10, 2015</a:t>
+            </a:r>
+          </a:p>
+          <a:p>
             <a:endParaRPr lang="en-US" dirty="0"/>
           </a:p>
-        </p:txBody>
-      </p:sp>
-      <p:sp>
-        <p:nvSpPr>
-          <p:cNvPr id="8" name="テキスト ボックス 7"/>
-          <p:cNvSpPr txBox="1"/>
-          <p:nvPr/>
-        </p:nvSpPr>
-        <p:spPr>
-          <a:xfrm>
-            <a:off x="1355461" y="2307569"/>
-            <a:ext cx="6379862" cy="584775"/>
-          </a:xfrm>
-          <a:prstGeom prst="rect">
-            <a:avLst/>
-          </a:prstGeom>
-          <a:noFill/>
-        </p:spPr>
-        <p:txBody>
-          <a:bodyPr wrap="square" rtlCol="0">
-            <a:spAutoFit/>
-          </a:bodyPr>
-          <a:lstStyle/>
-          <a:p>
-            <a:pPr algn="ctr"/>
-            <a:r>
-              <a:rPr lang="en-US" sz="3200" b="1" dirty="0" smtClean="0"/>
-              <a:t>Thank you for your attention!</a:t>
-            </a:r>
+          <a:p>
+            <a:r>
+              <a:rPr lang="en-US" dirty="0" smtClean="0"/>
+              <a:t>Thesis Documentation</a:t>
+            </a:r>
+          </a:p>
+          <a:p>
+            <a:endParaRPr lang="en-US" dirty="0"/>
+          </a:p>
+          <a:p>
+            <a:r>
+              <a:rPr lang="en-US" dirty="0" smtClean="0"/>
+              <a:t>User study </a:t>
+            </a:r>
+          </a:p>
+          <a:p>
+            <a:pPr lvl="1"/>
+            <a:r>
+              <a:rPr lang="en-US" dirty="0" smtClean="0"/>
+              <a:t>Think of scenarios</a:t>
+            </a:r>
+          </a:p>
+          <a:p>
+            <a:pPr lvl="1"/>
+            <a:r>
+              <a:rPr lang="en-US" dirty="0" smtClean="0"/>
+              <a:t>Collect user data</a:t>
+            </a:r>
+          </a:p>
+          <a:p>
+            <a:pPr lvl="1"/>
+            <a:endParaRPr lang="en-US" dirty="0"/>
+          </a:p>
+          <a:p>
+            <a:r>
+              <a:rPr lang="en-US" dirty="0" smtClean="0"/>
+              <a:t>Try to integrate with </a:t>
+            </a:r>
+            <a:r>
+              <a:rPr lang="en-US" dirty="0" err="1" smtClean="0"/>
+              <a:t>Turtlebot</a:t>
+            </a:r>
+            <a:r>
+              <a:rPr lang="en-US" dirty="0" smtClean="0"/>
+              <a:t> and Pepper?</a:t>
+            </a:r>
+          </a:p>
+          <a:p>
+            <a:endParaRPr lang="en-US" dirty="0"/>
+          </a:p>
+          <a:p>
+            <a:r>
+              <a:rPr lang="en-US" dirty="0" smtClean="0"/>
+              <a:t>Try to integrate IMU sensor??</a:t>
+            </a:r>
+            <a:endParaRPr lang="en-US" dirty="0"/>
           </a:p>
         </p:txBody>
       </p:sp>
     </p:spTree>
     <p:extLst>
       <p:ext uri="{BB962C8B-B14F-4D97-AF65-F5344CB8AC3E}">
-        <p14:creationId xmlns:p14="http://schemas.microsoft.com/office/powerpoint/2010/main" val="788678208"/>
+        <p14:creationId xmlns:p14="http://schemas.microsoft.com/office/powerpoint/2010/main" val="1980707321"/>
       </p:ext>
     </p:extLst>
   </p:cSld>
   <p:clrMapOvr>
     <a:masterClrMapping/>
   </p:clrMapOvr>
+  <mc:AlternateContent xmlns:mc="http://schemas.openxmlformats.org/markup-compatibility/2006" xmlns:p14="http://schemas.microsoft.com/office/powerpoint/2010/main">
+    <mc:Choice Requires="p14">
+      <p:transition spd="med" p14:dur="700">
+        <p:fade/>
+      </p:transition>
+    </mc:Choice>
+    <mc:Fallback xmlns="">
+      <p:transition spd="med">
+        <p:fade/>
+      </p:transition>
+    </mc:Fallback>
+  </mc:AlternateContent>
   <p:timing>
     <p:tnLst>
       <p:par>

</xml_diff>